<commit_message>
report figure for randomly generated objects
</commit_message>
<xml_diff>
--- a/app/img/Concept_art.pptx
+++ b/app/img/Concept_art.pptx
@@ -6,6 +6,7 @@
   </p:sldMasterIdLst>
   <p:sldIdLst>
     <p:sldId id="256" r:id="rId2"/>
+    <p:sldId id="257" r:id="rId3"/>
   </p:sldIdLst>
   <p:sldSz cx="12192000" cy="6858000"/>
   <p:notesSz cx="6858000" cy="9144000"/>
@@ -261,7 +262,7 @@
           <a:p>
             <a:fld id="{1AE93D9F-EC91-4270-BE28-A09FCD1ED6EC}" type="datetimeFigureOut">
               <a:rPr lang="en-GB" smtClean="0"/>
-              <a:t>28/01/2019</a:t>
+              <a:t>29/01/2019</a:t>
             </a:fld>
             <a:endParaRPr lang="en-GB"/>
           </a:p>
@@ -461,7 +462,7 @@
           <a:p>
             <a:fld id="{1AE93D9F-EC91-4270-BE28-A09FCD1ED6EC}" type="datetimeFigureOut">
               <a:rPr lang="en-GB" smtClean="0"/>
-              <a:t>28/01/2019</a:t>
+              <a:t>29/01/2019</a:t>
             </a:fld>
             <a:endParaRPr lang="en-GB"/>
           </a:p>
@@ -671,7 +672,7 @@
           <a:p>
             <a:fld id="{1AE93D9F-EC91-4270-BE28-A09FCD1ED6EC}" type="datetimeFigureOut">
               <a:rPr lang="en-GB" smtClean="0"/>
-              <a:t>28/01/2019</a:t>
+              <a:t>29/01/2019</a:t>
             </a:fld>
             <a:endParaRPr lang="en-GB"/>
           </a:p>
@@ -871,7 +872,7 @@
           <a:p>
             <a:fld id="{1AE93D9F-EC91-4270-BE28-A09FCD1ED6EC}" type="datetimeFigureOut">
               <a:rPr lang="en-GB" smtClean="0"/>
-              <a:t>28/01/2019</a:t>
+              <a:t>29/01/2019</a:t>
             </a:fld>
             <a:endParaRPr lang="en-GB"/>
           </a:p>
@@ -1147,7 +1148,7 @@
           <a:p>
             <a:fld id="{1AE93D9F-EC91-4270-BE28-A09FCD1ED6EC}" type="datetimeFigureOut">
               <a:rPr lang="en-GB" smtClean="0"/>
-              <a:t>28/01/2019</a:t>
+              <a:t>29/01/2019</a:t>
             </a:fld>
             <a:endParaRPr lang="en-GB"/>
           </a:p>
@@ -1415,7 +1416,7 @@
           <a:p>
             <a:fld id="{1AE93D9F-EC91-4270-BE28-A09FCD1ED6EC}" type="datetimeFigureOut">
               <a:rPr lang="en-GB" smtClean="0"/>
-              <a:t>28/01/2019</a:t>
+              <a:t>29/01/2019</a:t>
             </a:fld>
             <a:endParaRPr lang="en-GB"/>
           </a:p>
@@ -1830,7 +1831,7 @@
           <a:p>
             <a:fld id="{1AE93D9F-EC91-4270-BE28-A09FCD1ED6EC}" type="datetimeFigureOut">
               <a:rPr lang="en-GB" smtClean="0"/>
-              <a:t>28/01/2019</a:t>
+              <a:t>29/01/2019</a:t>
             </a:fld>
             <a:endParaRPr lang="en-GB"/>
           </a:p>
@@ -1972,7 +1973,7 @@
           <a:p>
             <a:fld id="{1AE93D9F-EC91-4270-BE28-A09FCD1ED6EC}" type="datetimeFigureOut">
               <a:rPr lang="en-GB" smtClean="0"/>
-              <a:t>28/01/2019</a:t>
+              <a:t>29/01/2019</a:t>
             </a:fld>
             <a:endParaRPr lang="en-GB"/>
           </a:p>
@@ -2085,7 +2086,7 @@
           <a:p>
             <a:fld id="{1AE93D9F-EC91-4270-BE28-A09FCD1ED6EC}" type="datetimeFigureOut">
               <a:rPr lang="en-GB" smtClean="0"/>
-              <a:t>28/01/2019</a:t>
+              <a:t>29/01/2019</a:t>
             </a:fld>
             <a:endParaRPr lang="en-GB"/>
           </a:p>
@@ -2398,7 +2399,7 @@
           <a:p>
             <a:fld id="{1AE93D9F-EC91-4270-BE28-A09FCD1ED6EC}" type="datetimeFigureOut">
               <a:rPr lang="en-GB" smtClean="0"/>
-              <a:t>28/01/2019</a:t>
+              <a:t>29/01/2019</a:t>
             </a:fld>
             <a:endParaRPr lang="en-GB"/>
           </a:p>
@@ -2687,7 +2688,7 @@
           <a:p>
             <a:fld id="{1AE93D9F-EC91-4270-BE28-A09FCD1ED6EC}" type="datetimeFigureOut">
               <a:rPr lang="en-GB" smtClean="0"/>
-              <a:t>28/01/2019</a:t>
+              <a:t>29/01/2019</a:t>
             </a:fld>
             <a:endParaRPr lang="en-GB"/>
           </a:p>
@@ -2930,7 +2931,7 @@
           <a:p>
             <a:fld id="{1AE93D9F-EC91-4270-BE28-A09FCD1ED6EC}" type="datetimeFigureOut">
               <a:rPr lang="en-GB" smtClean="0"/>
-              <a:t>28/01/2019</a:t>
+              <a:t>29/01/2019</a:t>
             </a:fld>
             <a:endParaRPr lang="en-GB"/>
           </a:p>
@@ -4473,6 +4474,908 @@
 </p:sld>
 </file>
 
+<file path=ppt/slides/slide2.xml><?xml version="1.0" encoding="utf-8"?>
+<p:sld xmlns:a="http://schemas.openxmlformats.org/drawingml/2006/main" xmlns:r="http://schemas.openxmlformats.org/officeDocument/2006/relationships" xmlns:p="http://schemas.openxmlformats.org/presentationml/2006/main">
+  <p:cSld>
+    <p:bg>
+      <p:bgPr>
+        <a:solidFill>
+          <a:schemeClr val="bg1"/>
+        </a:solidFill>
+        <a:effectLst/>
+      </p:bgPr>
+    </p:bg>
+    <p:spTree>
+      <p:nvGrpSpPr>
+        <p:cNvPr id="1" name=""/>
+        <p:cNvGrpSpPr/>
+        <p:nvPr/>
+      </p:nvGrpSpPr>
+      <p:grpSpPr>
+        <a:xfrm>
+          <a:off x="0" y="0"/>
+          <a:ext cx="0" cy="0"/>
+          <a:chOff x="0" y="0"/>
+          <a:chExt cx="0" cy="0"/>
+        </a:xfrm>
+      </p:grpSpPr>
+      <p:sp>
+        <p:nvSpPr>
+          <p:cNvPr id="37" name="Freeform: Shape 36">
+            <a:extLst>
+              <a:ext uri="{FF2B5EF4-FFF2-40B4-BE49-F238E27FC236}">
+                <a16:creationId xmlns:a16="http://schemas.microsoft.com/office/drawing/2014/main" id="{296BB291-4ABC-48EB-A20E-B11F249FD147}"/>
+              </a:ext>
+              <a:ext uri="{C183D7F6-B498-43B3-948B-1728B52AA6E4}">
+                <adec:decorative xmlns:adec="http://schemas.microsoft.com/office/drawing/2017/decorative" val="1"/>
+              </a:ext>
+            </a:extLst>
+          </p:cNvPr>
+          <p:cNvSpPr>
+            <a:spLocks noGrp="1" noRot="1" noChangeAspect="1" noMove="1" noResize="1" noEditPoints="1" noAdjustHandles="1" noChangeArrowheads="1" noChangeShapeType="1" noTextEdit="1"/>
+          </p:cNvSpPr>
+          <p:nvPr>
+            <p:extLst>
+              <p:ext uri="{386F3935-93C4-4BCD-93E2-E3B085C9AB24}">
+                <p16:designElem xmlns:p16="http://schemas.microsoft.com/office/powerpoint/2015/main" val="1"/>
+              </p:ext>
+            </p:extLst>
+          </p:nvPr>
+        </p:nvSpPr>
+        <p:spPr>
+          <a:xfrm>
+            <a:off x="8057285" y="0"/>
+            <a:ext cx="4134715" cy="3346705"/>
+          </a:xfrm>
+          <a:custGeom>
+            <a:avLst/>
+            <a:gdLst>
+              <a:gd name="connsiteX0" fmla="*/ 1549963 w 4134715"/>
+              <a:gd name="connsiteY0" fmla="*/ 0 h 3346705"/>
+              <a:gd name="connsiteX1" fmla="*/ 4134715 w 4134715"/>
+              <a:gd name="connsiteY1" fmla="*/ 0 h 3346705"/>
+              <a:gd name="connsiteX2" fmla="*/ 4134715 w 4134715"/>
+              <a:gd name="connsiteY2" fmla="*/ 3346705 h 3346705"/>
+              <a:gd name="connsiteX3" fmla="*/ 0 w 4134715"/>
+              <a:gd name="connsiteY3" fmla="*/ 3346705 h 3346705"/>
+            </a:gdLst>
+            <a:ahLst/>
+            <a:cxnLst>
+              <a:cxn ang="0">
+                <a:pos x="connsiteX0" y="connsiteY0"/>
+              </a:cxn>
+              <a:cxn ang="0">
+                <a:pos x="connsiteX1" y="connsiteY1"/>
+              </a:cxn>
+              <a:cxn ang="0">
+                <a:pos x="connsiteX2" y="connsiteY2"/>
+              </a:cxn>
+              <a:cxn ang="0">
+                <a:pos x="connsiteX3" y="connsiteY3"/>
+              </a:cxn>
+            </a:cxnLst>
+            <a:rect l="l" t="t" r="r" b="b"/>
+            <a:pathLst>
+              <a:path w="4134715" h="3346705">
+                <a:moveTo>
+                  <a:pt x="1549963" y="0"/>
+                </a:moveTo>
+                <a:lnTo>
+                  <a:pt x="4134715" y="0"/>
+                </a:lnTo>
+                <a:lnTo>
+                  <a:pt x="4134715" y="3346705"/>
+                </a:lnTo>
+                <a:lnTo>
+                  <a:pt x="0" y="3346705"/>
+                </a:lnTo>
+                <a:close/>
+              </a:path>
+            </a:pathLst>
+          </a:custGeom>
+          <a:solidFill>
+            <a:schemeClr val="tx1"/>
+          </a:solidFill>
+          <a:ln>
+            <a:noFill/>
+          </a:ln>
+        </p:spPr>
+        <p:style>
+          <a:lnRef idx="2">
+            <a:schemeClr val="accent1">
+              <a:shade val="50000"/>
+            </a:schemeClr>
+          </a:lnRef>
+          <a:fillRef idx="1">
+            <a:schemeClr val="accent1"/>
+          </a:fillRef>
+          <a:effectRef idx="0">
+            <a:schemeClr val="accent1"/>
+          </a:effectRef>
+          <a:fontRef idx="minor">
+            <a:schemeClr val="lt1"/>
+          </a:fontRef>
+        </p:style>
+        <p:txBody>
+          <a:bodyPr wrap="square" rtlCol="0" anchor="ctr">
+            <a:noAutofit/>
+          </a:bodyPr>
+          <a:lstStyle/>
+          <a:p>
+            <a:pPr algn="ctr"/>
+            <a:endParaRPr lang="en-US"/>
+          </a:p>
+        </p:txBody>
+      </p:sp>
+      <p:sp>
+        <p:nvSpPr>
+          <p:cNvPr id="39" name="Freeform: Shape 38">
+            <a:extLst>
+              <a:ext uri="{FF2B5EF4-FFF2-40B4-BE49-F238E27FC236}">
+                <a16:creationId xmlns:a16="http://schemas.microsoft.com/office/drawing/2014/main" id="{EF68680D-88C3-4223-8FF9-B7CEA07C1E90}"/>
+              </a:ext>
+              <a:ext uri="{C183D7F6-B498-43B3-948B-1728B52AA6E4}">
+                <adec:decorative xmlns:adec="http://schemas.microsoft.com/office/drawing/2017/decorative" val="1"/>
+              </a:ext>
+            </a:extLst>
+          </p:cNvPr>
+          <p:cNvSpPr>
+            <a:spLocks noGrp="1" noRot="1" noChangeAspect="1" noMove="1" noResize="1" noEditPoints="1" noAdjustHandles="1" noChangeArrowheads="1" noChangeShapeType="1" noTextEdit="1"/>
+          </p:cNvSpPr>
+          <p:nvPr>
+            <p:extLst>
+              <p:ext uri="{386F3935-93C4-4BCD-93E2-E3B085C9AB24}">
+                <p16:designElem xmlns:p16="http://schemas.microsoft.com/office/powerpoint/2015/main" val="1"/>
+              </p:ext>
+            </p:extLst>
+          </p:nvPr>
+        </p:nvSpPr>
+        <p:spPr>
+          <a:xfrm>
+            <a:off x="4508109" y="0"/>
+            <a:ext cx="4903560" cy="3346705"/>
+          </a:xfrm>
+          <a:custGeom>
+            <a:avLst/>
+            <a:gdLst>
+              <a:gd name="connsiteX0" fmla="*/ 1549963 w 4903560"/>
+              <a:gd name="connsiteY0" fmla="*/ 0 h 3346705"/>
+              <a:gd name="connsiteX1" fmla="*/ 4903560 w 4903560"/>
+              <a:gd name="connsiteY1" fmla="*/ 0 h 3346705"/>
+              <a:gd name="connsiteX2" fmla="*/ 3353597 w 4903560"/>
+              <a:gd name="connsiteY2" fmla="*/ 3346705 h 3346705"/>
+              <a:gd name="connsiteX3" fmla="*/ 0 w 4903560"/>
+              <a:gd name="connsiteY3" fmla="*/ 3346705 h 3346705"/>
+            </a:gdLst>
+            <a:ahLst/>
+            <a:cxnLst>
+              <a:cxn ang="0">
+                <a:pos x="connsiteX0" y="connsiteY0"/>
+              </a:cxn>
+              <a:cxn ang="0">
+                <a:pos x="connsiteX1" y="connsiteY1"/>
+              </a:cxn>
+              <a:cxn ang="0">
+                <a:pos x="connsiteX2" y="connsiteY2"/>
+              </a:cxn>
+              <a:cxn ang="0">
+                <a:pos x="connsiteX3" y="connsiteY3"/>
+              </a:cxn>
+            </a:cxnLst>
+            <a:rect l="l" t="t" r="r" b="b"/>
+            <a:pathLst>
+              <a:path w="4903560" h="3346705">
+                <a:moveTo>
+                  <a:pt x="1549963" y="0"/>
+                </a:moveTo>
+                <a:lnTo>
+                  <a:pt x="4903560" y="0"/>
+                </a:lnTo>
+                <a:lnTo>
+                  <a:pt x="3353597" y="3346705"/>
+                </a:lnTo>
+                <a:lnTo>
+                  <a:pt x="0" y="3346705"/>
+                </a:lnTo>
+                <a:close/>
+              </a:path>
+            </a:pathLst>
+          </a:custGeom>
+          <a:solidFill>
+            <a:schemeClr val="tx1"/>
+          </a:solidFill>
+          <a:ln>
+            <a:noFill/>
+          </a:ln>
+        </p:spPr>
+        <p:style>
+          <a:lnRef idx="2">
+            <a:schemeClr val="accent1">
+              <a:shade val="50000"/>
+            </a:schemeClr>
+          </a:lnRef>
+          <a:fillRef idx="1">
+            <a:schemeClr val="accent1"/>
+          </a:fillRef>
+          <a:effectRef idx="0">
+            <a:schemeClr val="accent1"/>
+          </a:effectRef>
+          <a:fontRef idx="minor">
+            <a:schemeClr val="lt1"/>
+          </a:fontRef>
+        </p:style>
+        <p:txBody>
+          <a:bodyPr wrap="square" rtlCol="0" anchor="ctr">
+            <a:noAutofit/>
+          </a:bodyPr>
+          <a:lstStyle/>
+          <a:p>
+            <a:pPr algn="ctr"/>
+            <a:endParaRPr lang="en-US"/>
+          </a:p>
+        </p:txBody>
+      </p:sp>
+      <p:sp>
+        <p:nvSpPr>
+          <p:cNvPr id="41" name="Freeform: Shape 40">
+            <a:extLst>
+              <a:ext uri="{FF2B5EF4-FFF2-40B4-BE49-F238E27FC236}">
+                <a16:creationId xmlns:a16="http://schemas.microsoft.com/office/drawing/2014/main" id="{1E45451A-56A1-4D57-8530-06665AB9628F}"/>
+              </a:ext>
+              <a:ext uri="{C183D7F6-B498-43B3-948B-1728B52AA6E4}">
+                <adec:decorative xmlns:adec="http://schemas.microsoft.com/office/drawing/2017/decorative" val="1"/>
+              </a:ext>
+            </a:extLst>
+          </p:cNvPr>
+          <p:cNvSpPr>
+            <a:spLocks noGrp="1" noRot="1" noChangeAspect="1" noMove="1" noResize="1" noEditPoints="1" noAdjustHandles="1" noChangeArrowheads="1" noChangeShapeType="1" noTextEdit="1"/>
+          </p:cNvSpPr>
+          <p:nvPr>
+            <p:extLst>
+              <p:ext uri="{386F3935-93C4-4BCD-93E2-E3B085C9AB24}">
+                <p16:designElem xmlns:p16="http://schemas.microsoft.com/office/powerpoint/2015/main" val="1"/>
+              </p:ext>
+            </p:extLst>
+          </p:nvPr>
+        </p:nvSpPr>
+        <p:spPr>
+          <a:xfrm>
+            <a:off x="1" y="0"/>
+            <a:ext cx="5882411" cy="3346705"/>
+          </a:xfrm>
+          <a:custGeom>
+            <a:avLst/>
+            <a:gdLst>
+              <a:gd name="connsiteX0" fmla="*/ 0 w 5882411"/>
+              <a:gd name="connsiteY0" fmla="*/ 0 h 3346705"/>
+              <a:gd name="connsiteX1" fmla="*/ 5882411 w 5882411"/>
+              <a:gd name="connsiteY1" fmla="*/ 0 h 3346705"/>
+              <a:gd name="connsiteX2" fmla="*/ 4332447 w 5882411"/>
+              <a:gd name="connsiteY2" fmla="*/ 3346705 h 3346705"/>
+              <a:gd name="connsiteX3" fmla="*/ 0 w 5882411"/>
+              <a:gd name="connsiteY3" fmla="*/ 3346705 h 3346705"/>
+            </a:gdLst>
+            <a:ahLst/>
+            <a:cxnLst>
+              <a:cxn ang="0">
+                <a:pos x="connsiteX0" y="connsiteY0"/>
+              </a:cxn>
+              <a:cxn ang="0">
+                <a:pos x="connsiteX1" y="connsiteY1"/>
+              </a:cxn>
+              <a:cxn ang="0">
+                <a:pos x="connsiteX2" y="connsiteY2"/>
+              </a:cxn>
+              <a:cxn ang="0">
+                <a:pos x="connsiteX3" y="connsiteY3"/>
+              </a:cxn>
+            </a:cxnLst>
+            <a:rect l="l" t="t" r="r" b="b"/>
+            <a:pathLst>
+              <a:path w="5882411" h="3346705">
+                <a:moveTo>
+                  <a:pt x="0" y="0"/>
+                </a:moveTo>
+                <a:lnTo>
+                  <a:pt x="5882411" y="0"/>
+                </a:lnTo>
+                <a:lnTo>
+                  <a:pt x="4332447" y="3346705"/>
+                </a:lnTo>
+                <a:lnTo>
+                  <a:pt x="0" y="3346705"/>
+                </a:lnTo>
+                <a:close/>
+              </a:path>
+            </a:pathLst>
+          </a:custGeom>
+          <a:solidFill>
+            <a:schemeClr val="tx1"/>
+          </a:solidFill>
+          <a:ln>
+            <a:noFill/>
+          </a:ln>
+        </p:spPr>
+        <p:style>
+          <a:lnRef idx="2">
+            <a:schemeClr val="accent1">
+              <a:shade val="50000"/>
+            </a:schemeClr>
+          </a:lnRef>
+          <a:fillRef idx="1">
+            <a:schemeClr val="accent1"/>
+          </a:fillRef>
+          <a:effectRef idx="0">
+            <a:schemeClr val="accent1"/>
+          </a:effectRef>
+          <a:fontRef idx="minor">
+            <a:schemeClr val="lt1"/>
+          </a:fontRef>
+        </p:style>
+        <p:txBody>
+          <a:bodyPr wrap="square" rtlCol="0" anchor="ctr">
+            <a:noAutofit/>
+          </a:bodyPr>
+          <a:lstStyle/>
+          <a:p>
+            <a:pPr algn="ctr"/>
+            <a:endParaRPr lang="en-US"/>
+          </a:p>
+        </p:txBody>
+      </p:sp>
+      <p:pic>
+        <p:nvPicPr>
+          <p:cNvPr id="7" name="Picture 6">
+            <a:extLst>
+              <a:ext uri="{FF2B5EF4-FFF2-40B4-BE49-F238E27FC236}">
+                <a16:creationId xmlns:a16="http://schemas.microsoft.com/office/drawing/2014/main" id="{C6F050DE-1F59-48CF-803F-4381C16A951B}"/>
+              </a:ext>
+            </a:extLst>
+          </p:cNvPr>
+          <p:cNvPicPr>
+            <a:picLocks noChangeAspect="1"/>
+          </p:cNvPicPr>
+          <p:nvPr/>
+        </p:nvPicPr>
+        <p:blipFill>
+          <a:blip r:embed="rId2">
+            <a:extLst>
+              <a:ext uri="{28A0092B-C50C-407E-A947-70E740481C1C}">
+                <a14:useLocalDpi xmlns:a14="http://schemas.microsoft.com/office/drawing/2010/main" val="0"/>
+              </a:ext>
+            </a:extLst>
+          </a:blip>
+          <a:stretch>
+            <a:fillRect/>
+          </a:stretch>
+        </p:blipFill>
+        <p:spPr>
+          <a:xfrm rot="17652223">
+            <a:off x="-1131187" y="-1926694"/>
+            <a:ext cx="6944145" cy="6944145"/>
+          </a:xfrm>
+          <a:prstGeom prst="rect">
+            <a:avLst/>
+          </a:prstGeom>
+        </p:spPr>
+      </p:pic>
+      <p:pic>
+        <p:nvPicPr>
+          <p:cNvPr id="9" name="Picture 8">
+            <a:extLst>
+              <a:ext uri="{FF2B5EF4-FFF2-40B4-BE49-F238E27FC236}">
+                <a16:creationId xmlns:a16="http://schemas.microsoft.com/office/drawing/2014/main" id="{289B2922-8FB7-4A22-BF85-635FB891D893}"/>
+              </a:ext>
+            </a:extLst>
+          </p:cNvPr>
+          <p:cNvPicPr>
+            <a:picLocks noChangeAspect="1"/>
+          </p:cNvPicPr>
+          <p:nvPr/>
+        </p:nvPicPr>
+        <p:blipFill>
+          <a:blip r:embed="rId3">
+            <a:extLst>
+              <a:ext uri="{28A0092B-C50C-407E-A947-70E740481C1C}">
+                <a14:useLocalDpi xmlns:a14="http://schemas.microsoft.com/office/drawing/2010/main" val="0"/>
+              </a:ext>
+            </a:extLst>
+          </a:blip>
+          <a:stretch>
+            <a:fillRect/>
+          </a:stretch>
+        </p:blipFill>
+        <p:spPr>
+          <a:xfrm>
+            <a:off x="4465840" y="-1319329"/>
+            <a:ext cx="5348033" cy="5348033"/>
+          </a:xfrm>
+          <a:prstGeom prst="rect">
+            <a:avLst/>
+          </a:prstGeom>
+        </p:spPr>
+      </p:pic>
+      <p:pic>
+        <p:nvPicPr>
+          <p:cNvPr id="13" name="Picture 12">
+            <a:extLst>
+              <a:ext uri="{FF2B5EF4-FFF2-40B4-BE49-F238E27FC236}">
+                <a16:creationId xmlns:a16="http://schemas.microsoft.com/office/drawing/2014/main" id="{87388404-52E4-478C-9D45-55F87604D1D1}"/>
+              </a:ext>
+            </a:extLst>
+          </p:cNvPr>
+          <p:cNvPicPr>
+            <a:picLocks noChangeAspect="1"/>
+          </p:cNvPicPr>
+          <p:nvPr/>
+        </p:nvPicPr>
+        <p:blipFill>
+          <a:blip r:embed="rId4">
+            <a:extLst>
+              <a:ext uri="{28A0092B-C50C-407E-A947-70E740481C1C}">
+                <a14:useLocalDpi xmlns:a14="http://schemas.microsoft.com/office/drawing/2010/main" val="0"/>
+              </a:ext>
+            </a:extLst>
+          </a:blip>
+          <a:stretch>
+            <a:fillRect/>
+          </a:stretch>
+        </p:blipFill>
+        <p:spPr>
+          <a:xfrm>
+            <a:off x="8872361" y="151631"/>
+            <a:ext cx="3277370" cy="3277370"/>
+          </a:xfrm>
+          <a:prstGeom prst="rect">
+            <a:avLst/>
+          </a:prstGeom>
+        </p:spPr>
+      </p:pic>
+      <p:sp>
+        <p:nvSpPr>
+          <p:cNvPr id="43" name="Freeform: Shape 42">
+            <a:extLst>
+              <a:ext uri="{FF2B5EF4-FFF2-40B4-BE49-F238E27FC236}">
+                <a16:creationId xmlns:a16="http://schemas.microsoft.com/office/drawing/2014/main" id="{558BA547-98A0-4003-8D14-BEC8A12577D0}"/>
+              </a:ext>
+              <a:ext uri="{C183D7F6-B498-43B3-948B-1728B52AA6E4}">
+                <adec:decorative xmlns:adec="http://schemas.microsoft.com/office/drawing/2017/decorative" val="1"/>
+              </a:ext>
+            </a:extLst>
+          </p:cNvPr>
+          <p:cNvSpPr>
+            <a:spLocks noGrp="1" noRot="1" noChangeAspect="1" noMove="1" noResize="1" noEditPoints="1" noAdjustHandles="1" noChangeArrowheads="1" noChangeShapeType="1" noTextEdit="1"/>
+          </p:cNvSpPr>
+          <p:nvPr>
+            <p:extLst>
+              <p:ext uri="{386F3935-93C4-4BCD-93E2-E3B085C9AB24}">
+                <p16:designElem xmlns:p16="http://schemas.microsoft.com/office/powerpoint/2015/main" val="1"/>
+              </p:ext>
+            </p:extLst>
+          </p:nvPr>
+        </p:nvSpPr>
+        <p:spPr>
+          <a:xfrm>
+            <a:off x="6431094" y="3511295"/>
+            <a:ext cx="5760906" cy="3346705"/>
+          </a:xfrm>
+          <a:custGeom>
+            <a:avLst/>
+            <a:gdLst>
+              <a:gd name="connsiteX0" fmla="*/ 1549964 w 5760906"/>
+              <a:gd name="connsiteY0" fmla="*/ 0 h 3346705"/>
+              <a:gd name="connsiteX1" fmla="*/ 5760906 w 5760906"/>
+              <a:gd name="connsiteY1" fmla="*/ 0 h 3346705"/>
+              <a:gd name="connsiteX2" fmla="*/ 5760906 w 5760906"/>
+              <a:gd name="connsiteY2" fmla="*/ 3346705 h 3346705"/>
+              <a:gd name="connsiteX3" fmla="*/ 0 w 5760906"/>
+              <a:gd name="connsiteY3" fmla="*/ 3346705 h 3346705"/>
+            </a:gdLst>
+            <a:ahLst/>
+            <a:cxnLst>
+              <a:cxn ang="0">
+                <a:pos x="connsiteX0" y="connsiteY0"/>
+              </a:cxn>
+              <a:cxn ang="0">
+                <a:pos x="connsiteX1" y="connsiteY1"/>
+              </a:cxn>
+              <a:cxn ang="0">
+                <a:pos x="connsiteX2" y="connsiteY2"/>
+              </a:cxn>
+              <a:cxn ang="0">
+                <a:pos x="connsiteX3" y="connsiteY3"/>
+              </a:cxn>
+            </a:cxnLst>
+            <a:rect l="l" t="t" r="r" b="b"/>
+            <a:pathLst>
+              <a:path w="5760906" h="3346705">
+                <a:moveTo>
+                  <a:pt x="1549964" y="0"/>
+                </a:moveTo>
+                <a:lnTo>
+                  <a:pt x="5760906" y="0"/>
+                </a:lnTo>
+                <a:lnTo>
+                  <a:pt x="5760906" y="3346705"/>
+                </a:lnTo>
+                <a:lnTo>
+                  <a:pt x="0" y="3346705"/>
+                </a:lnTo>
+                <a:close/>
+              </a:path>
+            </a:pathLst>
+          </a:custGeom>
+          <a:solidFill>
+            <a:schemeClr val="tx1"/>
+          </a:solidFill>
+          <a:ln>
+            <a:noFill/>
+          </a:ln>
+        </p:spPr>
+        <p:style>
+          <a:lnRef idx="2">
+            <a:schemeClr val="accent1">
+              <a:shade val="50000"/>
+            </a:schemeClr>
+          </a:lnRef>
+          <a:fillRef idx="1">
+            <a:schemeClr val="accent1"/>
+          </a:fillRef>
+          <a:effectRef idx="0">
+            <a:schemeClr val="accent1"/>
+          </a:effectRef>
+          <a:fontRef idx="minor">
+            <a:schemeClr val="lt1"/>
+          </a:fontRef>
+        </p:style>
+        <p:txBody>
+          <a:bodyPr wrap="square" rtlCol="0" anchor="ctr">
+            <a:noAutofit/>
+          </a:bodyPr>
+          <a:lstStyle/>
+          <a:p>
+            <a:pPr algn="ctr"/>
+            <a:endParaRPr lang="en-US"/>
+          </a:p>
+        </p:txBody>
+      </p:sp>
+      <p:sp>
+        <p:nvSpPr>
+          <p:cNvPr id="45" name="Freeform: Shape 44">
+            <a:extLst>
+              <a:ext uri="{FF2B5EF4-FFF2-40B4-BE49-F238E27FC236}">
+                <a16:creationId xmlns:a16="http://schemas.microsoft.com/office/drawing/2014/main" id="{7C498D76-5C8E-4439-9D70-BA9F56197405}"/>
+              </a:ext>
+              <a:ext uri="{C183D7F6-B498-43B3-948B-1728B52AA6E4}">
+                <adec:decorative xmlns:adec="http://schemas.microsoft.com/office/drawing/2017/decorative" val="1"/>
+              </a:ext>
+            </a:extLst>
+          </p:cNvPr>
+          <p:cNvSpPr>
+            <a:spLocks noGrp="1" noRot="1" noChangeAspect="1" noMove="1" noResize="1" noEditPoints="1" noAdjustHandles="1" noChangeArrowheads="1" noChangeShapeType="1" noTextEdit="1"/>
+          </p:cNvSpPr>
+          <p:nvPr>
+            <p:extLst>
+              <p:ext uri="{386F3935-93C4-4BCD-93E2-E3B085C9AB24}">
+                <p16:designElem xmlns:p16="http://schemas.microsoft.com/office/powerpoint/2015/main" val="1"/>
+              </p:ext>
+            </p:extLst>
+          </p:nvPr>
+        </p:nvSpPr>
+        <p:spPr>
+          <a:xfrm>
+            <a:off x="2881917" y="3511295"/>
+            <a:ext cx="4903562" cy="3346705"/>
+          </a:xfrm>
+          <a:custGeom>
+            <a:avLst/>
+            <a:gdLst>
+              <a:gd name="connsiteX0" fmla="*/ 1549965 w 4903562"/>
+              <a:gd name="connsiteY0" fmla="*/ 0 h 3346705"/>
+              <a:gd name="connsiteX1" fmla="*/ 4903562 w 4903562"/>
+              <a:gd name="connsiteY1" fmla="*/ 0 h 3346705"/>
+              <a:gd name="connsiteX2" fmla="*/ 3353599 w 4903562"/>
+              <a:gd name="connsiteY2" fmla="*/ 3346705 h 3346705"/>
+              <a:gd name="connsiteX3" fmla="*/ 0 w 4903562"/>
+              <a:gd name="connsiteY3" fmla="*/ 3346705 h 3346705"/>
+            </a:gdLst>
+            <a:ahLst/>
+            <a:cxnLst>
+              <a:cxn ang="0">
+                <a:pos x="connsiteX0" y="connsiteY0"/>
+              </a:cxn>
+              <a:cxn ang="0">
+                <a:pos x="connsiteX1" y="connsiteY1"/>
+              </a:cxn>
+              <a:cxn ang="0">
+                <a:pos x="connsiteX2" y="connsiteY2"/>
+              </a:cxn>
+              <a:cxn ang="0">
+                <a:pos x="connsiteX3" y="connsiteY3"/>
+              </a:cxn>
+            </a:cxnLst>
+            <a:rect l="l" t="t" r="r" b="b"/>
+            <a:pathLst>
+              <a:path w="4903562" h="3346705">
+                <a:moveTo>
+                  <a:pt x="1549965" y="0"/>
+                </a:moveTo>
+                <a:lnTo>
+                  <a:pt x="4903562" y="0"/>
+                </a:lnTo>
+                <a:lnTo>
+                  <a:pt x="3353599" y="3346705"/>
+                </a:lnTo>
+                <a:lnTo>
+                  <a:pt x="0" y="3346705"/>
+                </a:lnTo>
+                <a:close/>
+              </a:path>
+            </a:pathLst>
+          </a:custGeom>
+          <a:solidFill>
+            <a:schemeClr val="tx1"/>
+          </a:solidFill>
+          <a:ln>
+            <a:noFill/>
+          </a:ln>
+        </p:spPr>
+        <p:style>
+          <a:lnRef idx="2">
+            <a:schemeClr val="accent1">
+              <a:shade val="50000"/>
+            </a:schemeClr>
+          </a:lnRef>
+          <a:fillRef idx="1">
+            <a:schemeClr val="accent1"/>
+          </a:fillRef>
+          <a:effectRef idx="0">
+            <a:schemeClr val="accent1"/>
+          </a:effectRef>
+          <a:fontRef idx="minor">
+            <a:schemeClr val="lt1"/>
+          </a:fontRef>
+        </p:style>
+        <p:txBody>
+          <a:bodyPr wrap="square" rtlCol="0" anchor="ctr">
+            <a:noAutofit/>
+          </a:bodyPr>
+          <a:lstStyle/>
+          <a:p>
+            <a:pPr algn="ctr"/>
+            <a:endParaRPr lang="en-US"/>
+          </a:p>
+        </p:txBody>
+      </p:sp>
+      <p:sp>
+        <p:nvSpPr>
+          <p:cNvPr id="47" name="Freeform: Shape 46">
+            <a:extLst>
+              <a:ext uri="{FF2B5EF4-FFF2-40B4-BE49-F238E27FC236}">
+                <a16:creationId xmlns:a16="http://schemas.microsoft.com/office/drawing/2014/main" id="{F95AC789-3AB1-41E7-BF4E-6861EF948160}"/>
+              </a:ext>
+              <a:ext uri="{C183D7F6-B498-43B3-948B-1728B52AA6E4}">
+                <adec:decorative xmlns:adec="http://schemas.microsoft.com/office/drawing/2017/decorative" val="1"/>
+              </a:ext>
+            </a:extLst>
+          </p:cNvPr>
+          <p:cNvSpPr>
+            <a:spLocks noGrp="1" noRot="1" noChangeAspect="1" noMove="1" noResize="1" noEditPoints="1" noAdjustHandles="1" noChangeArrowheads="1" noChangeShapeType="1" noTextEdit="1"/>
+          </p:cNvSpPr>
+          <p:nvPr>
+            <p:extLst>
+              <p:ext uri="{386F3935-93C4-4BCD-93E2-E3B085C9AB24}">
+                <p16:designElem xmlns:p16="http://schemas.microsoft.com/office/powerpoint/2015/main" val="1"/>
+              </p:ext>
+            </p:extLst>
+          </p:nvPr>
+        </p:nvSpPr>
+        <p:spPr>
+          <a:xfrm>
+            <a:off x="1" y="3511295"/>
+            <a:ext cx="4256221" cy="3346705"/>
+          </a:xfrm>
+          <a:custGeom>
+            <a:avLst/>
+            <a:gdLst>
+              <a:gd name="connsiteX0" fmla="*/ 0 w 4256221"/>
+              <a:gd name="connsiteY0" fmla="*/ 0 h 3346705"/>
+              <a:gd name="connsiteX1" fmla="*/ 4256221 w 4256221"/>
+              <a:gd name="connsiteY1" fmla="*/ 0 h 3346705"/>
+              <a:gd name="connsiteX2" fmla="*/ 2706257 w 4256221"/>
+              <a:gd name="connsiteY2" fmla="*/ 3346705 h 3346705"/>
+              <a:gd name="connsiteX3" fmla="*/ 0 w 4256221"/>
+              <a:gd name="connsiteY3" fmla="*/ 3346705 h 3346705"/>
+            </a:gdLst>
+            <a:ahLst/>
+            <a:cxnLst>
+              <a:cxn ang="0">
+                <a:pos x="connsiteX0" y="connsiteY0"/>
+              </a:cxn>
+              <a:cxn ang="0">
+                <a:pos x="connsiteX1" y="connsiteY1"/>
+              </a:cxn>
+              <a:cxn ang="0">
+                <a:pos x="connsiteX2" y="connsiteY2"/>
+              </a:cxn>
+              <a:cxn ang="0">
+                <a:pos x="connsiteX3" y="connsiteY3"/>
+              </a:cxn>
+            </a:cxnLst>
+            <a:rect l="l" t="t" r="r" b="b"/>
+            <a:pathLst>
+              <a:path w="4256221" h="3346705">
+                <a:moveTo>
+                  <a:pt x="0" y="0"/>
+                </a:moveTo>
+                <a:lnTo>
+                  <a:pt x="4256221" y="0"/>
+                </a:lnTo>
+                <a:lnTo>
+                  <a:pt x="2706257" y="3346705"/>
+                </a:lnTo>
+                <a:lnTo>
+                  <a:pt x="0" y="3346705"/>
+                </a:lnTo>
+                <a:close/>
+              </a:path>
+            </a:pathLst>
+          </a:custGeom>
+          <a:solidFill>
+            <a:schemeClr val="tx1"/>
+          </a:solidFill>
+          <a:ln>
+            <a:noFill/>
+          </a:ln>
+        </p:spPr>
+        <p:style>
+          <a:lnRef idx="2">
+            <a:schemeClr val="accent1">
+              <a:shade val="50000"/>
+            </a:schemeClr>
+          </a:lnRef>
+          <a:fillRef idx="1">
+            <a:schemeClr val="accent1"/>
+          </a:fillRef>
+          <a:effectRef idx="0">
+            <a:schemeClr val="accent1"/>
+          </a:effectRef>
+          <a:fontRef idx="minor">
+            <a:schemeClr val="lt1"/>
+          </a:fontRef>
+        </p:style>
+        <p:txBody>
+          <a:bodyPr wrap="square" rtlCol="0" anchor="ctr">
+            <a:noAutofit/>
+          </a:bodyPr>
+          <a:lstStyle/>
+          <a:p>
+            <a:pPr algn="ctr"/>
+            <a:endParaRPr lang="en-US"/>
+          </a:p>
+        </p:txBody>
+      </p:sp>
+      <p:pic>
+        <p:nvPicPr>
+          <p:cNvPr id="15" name="Picture 14">
+            <a:extLst>
+              <a:ext uri="{FF2B5EF4-FFF2-40B4-BE49-F238E27FC236}">
+                <a16:creationId xmlns:a16="http://schemas.microsoft.com/office/drawing/2014/main" id="{4D7DF4F9-FCF2-4D90-9511-9556B76F7697}"/>
+              </a:ext>
+            </a:extLst>
+          </p:cNvPr>
+          <p:cNvPicPr>
+            <a:picLocks noChangeAspect="1"/>
+          </p:cNvPicPr>
+          <p:nvPr/>
+        </p:nvPicPr>
+        <p:blipFill>
+          <a:blip r:embed="rId5">
+            <a:extLst>
+              <a:ext uri="{28A0092B-C50C-407E-A947-70E740481C1C}">
+                <a14:useLocalDpi xmlns:a14="http://schemas.microsoft.com/office/drawing/2010/main" val="0"/>
+              </a:ext>
+            </a:extLst>
+          </a:blip>
+          <a:stretch>
+            <a:fillRect/>
+          </a:stretch>
+        </p:blipFill>
+        <p:spPr>
+          <a:xfrm>
+            <a:off x="-488129" y="3082009"/>
+            <a:ext cx="4200287" cy="4200287"/>
+          </a:xfrm>
+          <a:prstGeom prst="rect">
+            <a:avLst/>
+          </a:prstGeom>
+        </p:spPr>
+      </p:pic>
+      <p:pic>
+        <p:nvPicPr>
+          <p:cNvPr id="5" name="Picture 4">
+            <a:extLst>
+              <a:ext uri="{FF2B5EF4-FFF2-40B4-BE49-F238E27FC236}">
+                <a16:creationId xmlns:a16="http://schemas.microsoft.com/office/drawing/2014/main" id="{563A2000-3C9A-4108-9C2F-F646669A1966}"/>
+              </a:ext>
+            </a:extLst>
+          </p:cNvPr>
+          <p:cNvPicPr>
+            <a:picLocks noChangeAspect="1"/>
+          </p:cNvPicPr>
+          <p:nvPr/>
+        </p:nvPicPr>
+        <p:blipFill>
+          <a:blip r:embed="rId6">
+            <a:extLst>
+              <a:ext uri="{28A0092B-C50C-407E-A947-70E740481C1C}">
+                <a14:useLocalDpi xmlns:a14="http://schemas.microsoft.com/office/drawing/2010/main" val="0"/>
+              </a:ext>
+            </a:extLst>
+          </a:blip>
+          <a:stretch>
+            <a:fillRect/>
+          </a:stretch>
+        </p:blipFill>
+        <p:spPr>
+          <a:xfrm>
+            <a:off x="2990932" y="2697990"/>
+            <a:ext cx="4968326" cy="4968326"/>
+          </a:xfrm>
+          <a:prstGeom prst="rect">
+            <a:avLst/>
+          </a:prstGeom>
+        </p:spPr>
+      </p:pic>
+      <p:pic>
+        <p:nvPicPr>
+          <p:cNvPr id="11" name="Picture 10">
+            <a:extLst>
+              <a:ext uri="{FF2B5EF4-FFF2-40B4-BE49-F238E27FC236}">
+                <a16:creationId xmlns:a16="http://schemas.microsoft.com/office/drawing/2014/main" id="{3767AD84-5271-468E-A4B8-C5C58F4A601B}"/>
+              </a:ext>
+            </a:extLst>
+          </p:cNvPr>
+          <p:cNvPicPr>
+            <a:picLocks noChangeAspect="1"/>
+          </p:cNvPicPr>
+          <p:nvPr/>
+        </p:nvPicPr>
+        <p:blipFill>
+          <a:blip r:embed="rId7">
+            <a:extLst>
+              <a:ext uri="{28A0092B-C50C-407E-A947-70E740481C1C}">
+                <a14:useLocalDpi xmlns:a14="http://schemas.microsoft.com/office/drawing/2010/main" val="0"/>
+              </a:ext>
+            </a:extLst>
+          </a:blip>
+          <a:stretch>
+            <a:fillRect/>
+          </a:stretch>
+        </p:blipFill>
+        <p:spPr>
+          <a:xfrm>
+            <a:off x="6684362" y="2133083"/>
+            <a:ext cx="6103127" cy="6103127"/>
+          </a:xfrm>
+          <a:prstGeom prst="rect">
+            <a:avLst/>
+          </a:prstGeom>
+        </p:spPr>
+      </p:pic>
+    </p:spTree>
+    <p:extLst>
+      <p:ext uri="{BB962C8B-B14F-4D97-AF65-F5344CB8AC3E}">
+        <p14:creationId xmlns:p14="http://schemas.microsoft.com/office/powerpoint/2010/main" val="2119566171"/>
+      </p:ext>
+    </p:extLst>
+  </p:cSld>
+  <p:clrMapOvr>
+    <a:masterClrMapping/>
+  </p:clrMapOvr>
+</p:sld>
+</file>
+
 <file path=ppt/theme/theme1.xml><?xml version="1.0" encoding="utf-8"?>
 <a:theme xmlns:a="http://schemas.openxmlformats.org/drawingml/2006/main" name="Office Theme">
   <a:themeElements>

</xml_diff>

<commit_message>
merged app from branch
</commit_message>
<xml_diff>
--- a/app/img/Concept_art.pptx
+++ b/app/img/Concept_art.pptx
@@ -7,7 +7,6 @@
   <p:sldIdLst>
     <p:sldId id="256" r:id="rId2"/>
     <p:sldId id="257" r:id="rId3"/>
-    <p:sldId id="258" r:id="rId4"/>
   </p:sldIdLst>
   <p:sldSz cx="12192000" cy="6858000"/>
   <p:notesSz cx="6858000" cy="9144000"/>
@@ -5377,101 +5376,6 @@
 </p:sld>
 </file>
 
-<file path=ppt/slides/slide3.xml><?xml version="1.0" encoding="utf-8"?>
-<p:sld xmlns:a="http://schemas.openxmlformats.org/drawingml/2006/main" xmlns:r="http://schemas.openxmlformats.org/officeDocument/2006/relationships" xmlns:p="http://schemas.openxmlformats.org/presentationml/2006/main">
-  <p:cSld>
-    <p:bg>
-      <p:bgPr>
-        <a:solidFill>
-          <a:schemeClr val="tx1"/>
-        </a:solidFill>
-        <a:effectLst/>
-      </p:bgPr>
-    </p:bg>
-    <p:spTree>
-      <p:nvGrpSpPr>
-        <p:cNvPr id="1" name=""/>
-        <p:cNvGrpSpPr/>
-        <p:nvPr/>
-      </p:nvGrpSpPr>
-      <p:grpSpPr>
-        <a:xfrm>
-          <a:off x="0" y="0"/>
-          <a:ext cx="0" cy="0"/>
-          <a:chOff x="0" y="0"/>
-          <a:chExt cx="0" cy="0"/>
-        </a:xfrm>
-      </p:grpSpPr>
-      <p:pic>
-        <p:nvPicPr>
-          <p:cNvPr id="5" name="Content Placeholder 4">
-            <a:extLst>
-              <a:ext uri="{FF2B5EF4-FFF2-40B4-BE49-F238E27FC236}">
-                <a16:creationId xmlns:a16="http://schemas.microsoft.com/office/drawing/2014/main" id="{D191ED76-6109-4AF7-BD4D-7ADBEECF94C0}"/>
-              </a:ext>
-            </a:extLst>
-          </p:cNvPr>
-          <p:cNvPicPr>
-            <a:picLocks noGrp="1" noChangeAspect="1"/>
-          </p:cNvPicPr>
-          <p:nvPr>
-            <p:ph idx="1"/>
-          </p:nvPr>
-        </p:nvPicPr>
-        <p:blipFill>
-          <a:blip r:embed="rId2">
-            <a:extLst>
-              <a:ext uri="{BEBA8EAE-BF5A-486C-A8C5-ECC9F3942E4B}">
-                <a14:imgProps xmlns:a14="http://schemas.microsoft.com/office/drawing/2010/main">
-                  <a14:imgLayer r:embed="rId3">
-                    <a14:imgEffect>
-                      <a14:sharpenSoften amount="100000"/>
-                    </a14:imgEffect>
-                  </a14:imgLayer>
-                </a14:imgProps>
-              </a:ext>
-              <a:ext uri="{28A0092B-C50C-407E-A947-70E740481C1C}">
-                <a14:useLocalDpi xmlns:a14="http://schemas.microsoft.com/office/drawing/2010/main" val="0"/>
-              </a:ext>
-            </a:extLst>
-          </a:blip>
-          <a:stretch>
-            <a:fillRect/>
-          </a:stretch>
-        </p:blipFill>
-        <p:spPr>
-          <a:xfrm rot="5400000">
-            <a:off x="3354318" y="1438652"/>
-            <a:ext cx="5483363" cy="3980696"/>
-          </a:xfrm>
-          <a:noFill/>
-          <a:ln>
-            <a:noFill/>
-          </a:ln>
-          <a:effectLst>
-            <a:glow>
-              <a:schemeClr val="accent4">
-                <a:satMod val="175000"/>
-                <a:alpha val="40000"/>
-              </a:schemeClr>
-            </a:glow>
-            <a:softEdge rad="0"/>
-          </a:effectLst>
-        </p:spPr>
-      </p:pic>
-    </p:spTree>
-    <p:extLst>
-      <p:ext uri="{BB962C8B-B14F-4D97-AF65-F5344CB8AC3E}">
-        <p14:creationId xmlns:p14="http://schemas.microsoft.com/office/powerpoint/2010/main" val="2290131288"/>
-      </p:ext>
-    </p:extLst>
-  </p:cSld>
-  <p:clrMapOvr>
-    <a:masterClrMapping/>
-  </p:clrMapOvr>
-</p:sld>
-</file>
-
 <file path=ppt/theme/theme1.xml><?xml version="1.0" encoding="utf-8"?>
 <a:theme xmlns:a="http://schemas.openxmlformats.org/drawingml/2006/main" name="Office Theme">
   <a:themeElements>

</xml_diff>